<commit_message>
Fix figures in Sec 3 through 9.
</commit_message>
<xml_diff>
--- a/ITI/TF/Volume1/media/Figure_3.1-1.pptx
+++ b/ITI/TF/Volume1/media/Figure_3.1-1.pptx
@@ -104,6 +104,11 @@
       </a:defRPr>
     </a:lvl9pPr>
   </p:defaultTextStyle>
+  <p:extLst>
+    <p:ext uri="{EFAFB233-063F-42B5-8137-9DF3F51BA10A}">
+      <p15:sldGuideLst xmlns:p15="http://schemas.microsoft.com/office/powerpoint/2012/main"/>
+    </p:ext>
+  </p:extLst>
 </p:presentation>
 </file>
 
@@ -254,7 +259,7 @@
           <a:p>
             <a:fld id="{EF54876F-5BAD-874D-87D6-58CA90A6335F}" type="datetimeFigureOut">
               <a:rPr lang="en-US" smtClean="0"/>
-              <a:t>8/10/20</a:t>
+              <a:t>8/26/20</a:t>
             </a:fld>
             <a:endParaRPr lang="en-US"/>
           </a:p>
@@ -452,7 +457,7 @@
           <a:p>
             <a:fld id="{EF54876F-5BAD-874D-87D6-58CA90A6335F}" type="datetimeFigureOut">
               <a:rPr lang="en-US" smtClean="0"/>
-              <a:t>8/10/20</a:t>
+              <a:t>8/26/20</a:t>
             </a:fld>
             <a:endParaRPr lang="en-US"/>
           </a:p>
@@ -660,7 +665,7 @@
           <a:p>
             <a:fld id="{EF54876F-5BAD-874D-87D6-58CA90A6335F}" type="datetimeFigureOut">
               <a:rPr lang="en-US" smtClean="0"/>
-              <a:t>8/10/20</a:t>
+              <a:t>8/26/20</a:t>
             </a:fld>
             <a:endParaRPr lang="en-US"/>
           </a:p>
@@ -858,7 +863,7 @@
           <a:p>
             <a:fld id="{EF54876F-5BAD-874D-87D6-58CA90A6335F}" type="datetimeFigureOut">
               <a:rPr lang="en-US" smtClean="0"/>
-              <a:t>8/10/20</a:t>
+              <a:t>8/26/20</a:t>
             </a:fld>
             <a:endParaRPr lang="en-US"/>
           </a:p>
@@ -1133,7 +1138,7 @@
           <a:p>
             <a:fld id="{EF54876F-5BAD-874D-87D6-58CA90A6335F}" type="datetimeFigureOut">
               <a:rPr lang="en-US" smtClean="0"/>
-              <a:t>8/10/20</a:t>
+              <a:t>8/26/20</a:t>
             </a:fld>
             <a:endParaRPr lang="en-US"/>
           </a:p>
@@ -1398,7 +1403,7 @@
           <a:p>
             <a:fld id="{EF54876F-5BAD-874D-87D6-58CA90A6335F}" type="datetimeFigureOut">
               <a:rPr lang="en-US" smtClean="0"/>
-              <a:t>8/10/20</a:t>
+              <a:t>8/26/20</a:t>
             </a:fld>
             <a:endParaRPr lang="en-US"/>
           </a:p>
@@ -1810,7 +1815,7 @@
           <a:p>
             <a:fld id="{EF54876F-5BAD-874D-87D6-58CA90A6335F}" type="datetimeFigureOut">
               <a:rPr lang="en-US" smtClean="0"/>
-              <a:t>8/10/20</a:t>
+              <a:t>8/26/20</a:t>
             </a:fld>
             <a:endParaRPr lang="en-US"/>
           </a:p>
@@ -1951,7 +1956,7 @@
           <a:p>
             <a:fld id="{EF54876F-5BAD-874D-87D6-58CA90A6335F}" type="datetimeFigureOut">
               <a:rPr lang="en-US" smtClean="0"/>
-              <a:t>8/10/20</a:t>
+              <a:t>8/26/20</a:t>
             </a:fld>
             <a:endParaRPr lang="en-US"/>
           </a:p>
@@ -2064,7 +2069,7 @@
           <a:p>
             <a:fld id="{EF54876F-5BAD-874D-87D6-58CA90A6335F}" type="datetimeFigureOut">
               <a:rPr lang="en-US" smtClean="0"/>
-              <a:t>8/10/20</a:t>
+              <a:t>8/26/20</a:t>
             </a:fld>
             <a:endParaRPr lang="en-US"/>
           </a:p>
@@ -2375,7 +2380,7 @@
           <a:p>
             <a:fld id="{EF54876F-5BAD-874D-87D6-58CA90A6335F}" type="datetimeFigureOut">
               <a:rPr lang="en-US" smtClean="0"/>
-              <a:t>8/10/20</a:t>
+              <a:t>8/26/20</a:t>
             </a:fld>
             <a:endParaRPr lang="en-US"/>
           </a:p>
@@ -2663,7 +2668,7 @@
           <a:p>
             <a:fld id="{EF54876F-5BAD-874D-87D6-58CA90A6335F}" type="datetimeFigureOut">
               <a:rPr lang="en-US" smtClean="0"/>
-              <a:t>8/10/20</a:t>
+              <a:t>8/26/20</a:t>
             </a:fld>
             <a:endParaRPr lang="en-US"/>
           </a:p>
@@ -2904,7 +2909,7 @@
           <a:p>
             <a:fld id="{EF54876F-5BAD-874D-87D6-58CA90A6335F}" type="datetimeFigureOut">
               <a:rPr lang="en-US" smtClean="0"/>
-              <a:t>8/10/20</a:t>
+              <a:t>8/26/20</a:t>
             </a:fld>
             <a:endParaRPr lang="en-US"/>
           </a:p>
@@ -3483,8 +3488,36 @@
               <a:buNone/>
               <a:tabLst/>
             </a:pPr>
-            <a:r>
-              <a:rPr kumimoji="0" lang="en-AU" altLang="en-US" sz="1600" b="0" i="0" u="none" strike="noStrike" cap="none" normalizeH="0" baseline="0">
+            <a:endParaRPr kumimoji="0" lang="en-AU" altLang="en-US" sz="1600" b="0" i="0" u="none" strike="noStrike" cap="none" normalizeH="0" baseline="0" dirty="0">
+              <a:ln>
+                <a:noFill/>
+              </a:ln>
+              <a:solidFill>
+                <a:schemeClr val="tx1"/>
+              </a:solidFill>
+              <a:effectLst/>
+              <a:latin typeface="Times New Roman" panose="02020603050405020304" pitchFamily="18" charset="0"/>
+            </a:endParaRPr>
+          </a:p>
+          <a:p>
+            <a:pPr marL="0" marR="0" lvl="0" indent="0" algn="ctr" defTabSz="914400" rtl="0" eaLnBrk="0" fontAlgn="base" latinLnBrk="0" hangingPunct="0">
+              <a:lnSpc>
+                <a:spcPct val="100000"/>
+              </a:lnSpc>
+              <a:spcBef>
+                <a:spcPct val="0"/>
+              </a:spcBef>
+              <a:spcAft>
+                <a:spcPct val="0"/>
+              </a:spcAft>
+              <a:buClrTx/>
+              <a:buSzTx/>
+              <a:buFontTx/>
+              <a:buNone/>
+              <a:tabLst/>
+            </a:pPr>
+            <a:r>
+              <a:rPr kumimoji="0" lang="en-AU" altLang="en-US" sz="1600" b="0" i="0" u="none" strike="noStrike" cap="none" normalizeH="0" baseline="0" dirty="0">
                 <a:ln>
                   <a:noFill/>
                 </a:ln>
@@ -3496,7 +3529,7 @@
               </a:rPr>
               <a:t>Display</a:t>
             </a:r>
-            <a:endParaRPr kumimoji="0" lang="en-AU" altLang="en-US" sz="1400" b="0" i="0" u="none" strike="noStrike" cap="none" normalizeH="0" baseline="0">
+            <a:endParaRPr kumimoji="0" lang="en-AU" altLang="en-US" sz="1400" b="0" i="0" u="none" strike="noStrike" cap="none" normalizeH="0" baseline="0" dirty="0">
               <a:ln>
                 <a:noFill/>
               </a:ln>
@@ -3524,7 +3557,7 @@
               <a:buNone/>
               <a:tabLst/>
             </a:pPr>
-            <a:endParaRPr kumimoji="0" lang="en-AU" altLang="en-US" sz="1800" b="0" i="0" u="none" strike="noStrike" cap="none" normalizeH="0" baseline="0">
+            <a:endParaRPr kumimoji="0" lang="en-AU" altLang="en-US" sz="1800" b="0" i="0" u="none" strike="noStrike" cap="none" normalizeH="0" baseline="0" dirty="0">
               <a:ln>
                 <a:noFill/>
               </a:ln>
@@ -3596,7 +3629,7 @@
               <a:tabLst/>
             </a:pPr>
             <a:r>
-              <a:rPr kumimoji="0" lang="en-AU" altLang="en-US" sz="1600" b="0" i="0" u="none" strike="noStrike" cap="none" normalizeH="0" baseline="0">
+              <a:rPr kumimoji="0" lang="en-AU" altLang="en-US" sz="1600" b="0" i="0" u="none" strike="noStrike" cap="none" normalizeH="0" baseline="0" dirty="0">
                 <a:ln>
                   <a:noFill/>
                 </a:ln>
@@ -3604,11 +3637,13 @@
                   <a:schemeClr val="tx1"/>
                 </a:solidFill>
                 <a:effectLst/>
+                <a:latin typeface="Times New Roman" panose="02020603050405020304" pitchFamily="18" charset="0"/>
                 <a:ea typeface="Times New Roman" panose="02020603050405020304" pitchFamily="18" charset="0"/>
+                <a:cs typeface="Times New Roman" panose="02020603050405020304" pitchFamily="18" charset="0"/>
               </a:rPr>
               <a:t>Information Source</a:t>
             </a:r>
-            <a:endParaRPr kumimoji="0" lang="en-AU" altLang="en-US" sz="1800" b="0" i="0" u="none" strike="noStrike" cap="none" normalizeH="0" baseline="0">
+            <a:endParaRPr kumimoji="0" lang="en-AU" altLang="en-US" sz="1800" b="0" i="0" u="none" strike="noStrike" cap="none" normalizeH="0" baseline="0" dirty="0">
               <a:ln>
                 <a:noFill/>
               </a:ln>
@@ -3616,7 +3651,8 @@
                 <a:schemeClr val="tx1"/>
               </a:solidFill>
               <a:effectLst/>
-              <a:latin typeface="Arial" panose="020B0604020202020204" pitchFamily="34" charset="0"/>
+              <a:latin typeface="Times New Roman" panose="02020603050405020304" pitchFamily="18" charset="0"/>
+              <a:cs typeface="Times New Roman" panose="02020603050405020304" pitchFamily="18" charset="0"/>
             </a:endParaRPr>
           </a:p>
         </p:txBody>
@@ -3688,8 +3724,8 @@
         </p:nvSpPr>
         <p:spPr bwMode="auto">
           <a:xfrm>
-            <a:off x="2509838" y="1425575"/>
-            <a:ext cx="2730500" cy="355600"/>
+            <a:off x="2402962" y="1496825"/>
+            <a:ext cx="2851149" cy="355600"/>
           </a:xfrm>
           <a:prstGeom prst="rect">
             <a:avLst/>
@@ -3743,7 +3779,7 @@
               <a:tabLst/>
             </a:pPr>
             <a:r>
-              <a:rPr kumimoji="0" lang="en-AU" altLang="en-US" sz="1000" b="0" i="0" u="none" strike="noStrike" cap="none" normalizeH="0" baseline="0">
+              <a:rPr kumimoji="0" lang="en-AU" altLang="en-US" sz="1000" b="0" i="0" u="none" strike="noStrike" cap="none" normalizeH="0" baseline="0" dirty="0">
                 <a:ln>
                   <a:noFill/>
                 </a:ln>
@@ -3757,7 +3793,7 @@
               <a:t>  </a:t>
             </a:r>
             <a:r>
-              <a:rPr kumimoji="0" lang="en-AU" altLang="en-US" sz="1100" b="0" i="0" u="none" strike="noStrike" cap="none" normalizeH="0" baseline="0">
+              <a:rPr kumimoji="0" lang="en-AU" altLang="en-US" sz="1100" b="0" i="0" u="none" strike="noStrike" cap="none" normalizeH="0" baseline="0" dirty="0">
                 <a:ln>
                   <a:noFill/>
                 </a:ln>
@@ -3765,12 +3801,13 @@
                   <a:schemeClr val="tx1"/>
                 </a:solidFill>
                 <a:effectLst/>
-                <a:latin typeface="Arial" panose="020B0604020202020204" pitchFamily="34" charset="0"/>
+                <a:latin typeface="Times New Roman" panose="02020603050405020304" pitchFamily="18" charset="0"/>
                 <a:ea typeface="Times New Roman" panose="02020603050405020304" pitchFamily="18" charset="0"/>
+                <a:cs typeface="Times New Roman" panose="02020603050405020304" pitchFamily="18" charset="0"/>
               </a:rPr>
               <a:t>Retrieve Specific Info for Display [ITI-11]</a:t>
             </a:r>
-            <a:endParaRPr kumimoji="0" lang="en-AU" altLang="en-US" sz="1800" b="0" i="0" u="none" strike="noStrike" cap="none" normalizeH="0" baseline="0">
+            <a:endParaRPr kumimoji="0" lang="en-AU" altLang="en-US" sz="1800" b="0" i="0" u="none" strike="noStrike" cap="none" normalizeH="0" baseline="0" dirty="0">
               <a:ln>
                 <a:noFill/>
               </a:ln>
@@ -3778,7 +3815,8 @@
                 <a:schemeClr val="tx1"/>
               </a:solidFill>
               <a:effectLst/>
-              <a:latin typeface="Arial" panose="020B0604020202020204" pitchFamily="34" charset="0"/>
+              <a:latin typeface="Times New Roman" panose="02020603050405020304" pitchFamily="18" charset="0"/>
+              <a:cs typeface="Times New Roman" panose="02020603050405020304" pitchFamily="18" charset="0"/>
             </a:endParaRPr>
           </a:p>
         </p:txBody>
@@ -3799,7 +3837,7 @@
         </p:nvSpPr>
         <p:spPr bwMode="auto">
           <a:xfrm>
-            <a:off x="2509838" y="2019300"/>
+            <a:off x="2509838" y="2054925"/>
             <a:ext cx="2613025" cy="355600"/>
           </a:xfrm>
           <a:prstGeom prst="rect">
@@ -3854,7 +3892,7 @@
               <a:tabLst/>
             </a:pPr>
             <a:r>
-              <a:rPr kumimoji="0" lang="en-AU" altLang="en-US" sz="1100" b="0" i="0" u="none" strike="noStrike" cap="none" normalizeH="0" baseline="0">
+              <a:rPr kumimoji="0" lang="en-AU" altLang="en-US" sz="1100" b="0" i="0" u="none" strike="noStrike" cap="none" normalizeH="0" baseline="0" dirty="0">
                 <a:ln>
                   <a:noFill/>
                 </a:ln>
@@ -3865,9 +3903,24 @@
                 <a:latin typeface="Arial" panose="020B0604020202020204" pitchFamily="34" charset="0"/>
                 <a:ea typeface="Times New Roman" panose="02020603050405020304" pitchFamily="18" charset="0"/>
               </a:rPr>
-              <a:t> Retrieve Document for Display [ITI-12]  </a:t>
-            </a:r>
-            <a:endParaRPr kumimoji="0" lang="en-AU" altLang="en-US" sz="1800" b="0" i="0" u="none" strike="noStrike" cap="none" normalizeH="0" baseline="0">
+              <a:t> </a:t>
+            </a:r>
+            <a:r>
+              <a:rPr kumimoji="0" lang="en-AU" altLang="en-US" sz="1100" b="0" i="0" u="none" strike="noStrike" cap="none" normalizeH="0" baseline="0" dirty="0">
+                <a:ln>
+                  <a:noFill/>
+                </a:ln>
+                <a:solidFill>
+                  <a:schemeClr val="tx1"/>
+                </a:solidFill>
+                <a:effectLst/>
+                <a:latin typeface="Times New Roman" panose="02020603050405020304" pitchFamily="18" charset="0"/>
+                <a:ea typeface="Times New Roman" panose="02020603050405020304" pitchFamily="18" charset="0"/>
+                <a:cs typeface="Times New Roman" panose="02020603050405020304" pitchFamily="18" charset="0"/>
+              </a:rPr>
+              <a:t>Retrieve Document for Display [ITI-12]  </a:t>
+            </a:r>
+            <a:endParaRPr kumimoji="0" lang="en-AU" altLang="en-US" sz="1800" b="0" i="0" u="none" strike="noStrike" cap="none" normalizeH="0" baseline="0" dirty="0">
               <a:ln>
                 <a:noFill/>
               </a:ln>
@@ -3875,7 +3928,8 @@
                 <a:schemeClr val="tx1"/>
               </a:solidFill>
               <a:effectLst/>
-              <a:latin typeface="Arial" panose="020B0604020202020204" pitchFamily="34" charset="0"/>
+              <a:latin typeface="Times New Roman" panose="02020603050405020304" pitchFamily="18" charset="0"/>
+              <a:cs typeface="Times New Roman" panose="02020603050405020304" pitchFamily="18" charset="0"/>
             </a:endParaRPr>
           </a:p>
         </p:txBody>

</xml_diff>